<commit_message>
ace percentage in process
</commit_message>
<xml_diff>
--- a/ATP Tennis Matches.pptx
+++ b/ATP Tennis Matches.pptx
@@ -23,7 +23,8 @@
     <p:sldId id="274" r:id="rId17"/>
     <p:sldId id="276" r:id="rId18"/>
     <p:sldId id="275" r:id="rId19"/>
-    <p:sldId id="272" r:id="rId20"/>
+    <p:sldId id="277" r:id="rId20"/>
+    <p:sldId id="278" r:id="rId21"/>
   </p:sldIdLst>
   <p:sldSz cx="12192000" cy="6858000"/>
   <p:notesSz cx="6858000" cy="9144000"/>
@@ -908,7 +909,7 @@
           <a:p>
             <a:fld id="{1F86CEB3-6F70-454A-B51E-17576E9526B1}" type="datetimeFigureOut">
               <a:rPr lang="en-US" smtClean="0"/>
-              <a:t>12/2/2025</a:t>
+              <a:t>12/3/2025</a:t>
             </a:fld>
             <a:endParaRPr lang="en-US"/>
           </a:p>
@@ -1159,7 +1160,7 @@
           <a:p>
             <a:fld id="{1F86CEB3-6F70-454A-B51E-17576E9526B1}" type="datetimeFigureOut">
               <a:rPr lang="en-US" smtClean="0"/>
-              <a:t>12/2/2025</a:t>
+              <a:t>12/3/2025</a:t>
             </a:fld>
             <a:endParaRPr lang="en-US"/>
           </a:p>
@@ -1473,7 +1474,7 @@
           <a:p>
             <a:fld id="{1F86CEB3-6F70-454A-B51E-17576E9526B1}" type="datetimeFigureOut">
               <a:rPr lang="en-US" smtClean="0"/>
-              <a:t>12/2/2025</a:t>
+              <a:t>12/3/2025</a:t>
             </a:fld>
             <a:endParaRPr lang="en-US"/>
           </a:p>
@@ -1814,7 +1815,7 @@
           <a:p>
             <a:fld id="{1F86CEB3-6F70-454A-B51E-17576E9526B1}" type="datetimeFigureOut">
               <a:rPr lang="en-US" smtClean="0"/>
-              <a:t>12/2/2025</a:t>
+              <a:t>12/3/2025</a:t>
             </a:fld>
             <a:endParaRPr lang="en-US"/>
           </a:p>
@@ -2128,7 +2129,7 @@
           <a:p>
             <a:fld id="{1F86CEB3-6F70-454A-B51E-17576E9526B1}" type="datetimeFigureOut">
               <a:rPr lang="en-US" smtClean="0"/>
-              <a:t>12/2/2025</a:t>
+              <a:t>12/3/2025</a:t>
             </a:fld>
             <a:endParaRPr lang="en-US"/>
           </a:p>
@@ -2521,7 +2522,7 @@
           <a:p>
             <a:fld id="{1F86CEB3-6F70-454A-B51E-17576E9526B1}" type="datetimeFigureOut">
               <a:rPr lang="en-US" smtClean="0"/>
-              <a:t>12/2/2025</a:t>
+              <a:t>12/3/2025</a:t>
             </a:fld>
             <a:endParaRPr lang="en-US"/>
           </a:p>
@@ -2691,7 +2692,7 @@
           <a:p>
             <a:fld id="{1F86CEB3-6F70-454A-B51E-17576E9526B1}" type="datetimeFigureOut">
               <a:rPr lang="en-US" smtClean="0"/>
-              <a:t>12/2/2025</a:t>
+              <a:t>12/3/2025</a:t>
             </a:fld>
             <a:endParaRPr lang="en-US"/>
           </a:p>
@@ -2871,7 +2872,7 @@
           <a:p>
             <a:fld id="{1F86CEB3-6F70-454A-B51E-17576E9526B1}" type="datetimeFigureOut">
               <a:rPr lang="en-US" smtClean="0"/>
-              <a:t>12/2/2025</a:t>
+              <a:t>12/3/2025</a:t>
             </a:fld>
             <a:endParaRPr lang="en-US"/>
           </a:p>
@@ -3047,7 +3048,7 @@
           <a:p>
             <a:fld id="{1F86CEB3-6F70-454A-B51E-17576E9526B1}" type="datetimeFigureOut">
               <a:rPr lang="en-US" smtClean="0"/>
-              <a:t>12/2/2025</a:t>
+              <a:t>12/3/2025</a:t>
             </a:fld>
             <a:endParaRPr lang="en-US"/>
           </a:p>
@@ -3294,7 +3295,7 @@
           <a:p>
             <a:fld id="{1F86CEB3-6F70-454A-B51E-17576E9526B1}" type="datetimeFigureOut">
               <a:rPr lang="en-US" smtClean="0"/>
-              <a:t>12/2/2025</a:t>
+              <a:t>12/3/2025</a:t>
             </a:fld>
             <a:endParaRPr lang="en-US"/>
           </a:p>
@@ -3526,7 +3527,7 @@
           <a:p>
             <a:fld id="{1F86CEB3-6F70-454A-B51E-17576E9526B1}" type="datetimeFigureOut">
               <a:rPr lang="en-US" smtClean="0"/>
-              <a:t>12/2/2025</a:t>
+              <a:t>12/3/2025</a:t>
             </a:fld>
             <a:endParaRPr lang="en-US"/>
           </a:p>
@@ -3900,7 +3901,7 @@
           <a:p>
             <a:fld id="{1F86CEB3-6F70-454A-B51E-17576E9526B1}" type="datetimeFigureOut">
               <a:rPr lang="en-US" smtClean="0"/>
-              <a:t>12/2/2025</a:t>
+              <a:t>12/3/2025</a:t>
             </a:fld>
             <a:endParaRPr lang="en-US"/>
           </a:p>
@@ -4023,7 +4024,7 @@
           <a:p>
             <a:fld id="{1F86CEB3-6F70-454A-B51E-17576E9526B1}" type="datetimeFigureOut">
               <a:rPr lang="en-US" smtClean="0"/>
-              <a:t>12/2/2025</a:t>
+              <a:t>12/3/2025</a:t>
             </a:fld>
             <a:endParaRPr lang="en-US"/>
           </a:p>
@@ -4118,7 +4119,7 @@
           <a:p>
             <a:fld id="{1F86CEB3-6F70-454A-B51E-17576E9526B1}" type="datetimeFigureOut">
               <a:rPr lang="en-US" smtClean="0"/>
-              <a:t>12/2/2025</a:t>
+              <a:t>12/3/2025</a:t>
             </a:fld>
             <a:endParaRPr lang="en-US"/>
           </a:p>
@@ -4373,7 +4374,7 @@
           <a:p>
             <a:fld id="{1F86CEB3-6F70-454A-B51E-17576E9526B1}" type="datetimeFigureOut">
               <a:rPr lang="en-US" smtClean="0"/>
-              <a:t>12/2/2025</a:t>
+              <a:t>12/3/2025</a:t>
             </a:fld>
             <a:endParaRPr lang="en-US"/>
           </a:p>
@@ -4636,7 +4637,7 @@
           <a:p>
             <a:fld id="{1F86CEB3-6F70-454A-B51E-17576E9526B1}" type="datetimeFigureOut">
               <a:rPr lang="en-US" smtClean="0"/>
-              <a:t>12/2/2025</a:t>
+              <a:t>12/3/2025</a:t>
             </a:fld>
             <a:endParaRPr lang="en-US"/>
           </a:p>
@@ -5435,7 +5436,7 @@
           <a:p>
             <a:fld id="{1F86CEB3-6F70-454A-B51E-17576E9526B1}" type="datetimeFigureOut">
               <a:rPr lang="en-US" smtClean="0"/>
-              <a:t>12/2/2025</a:t>
+              <a:t>12/3/2025</a:t>
             </a:fld>
             <a:endParaRPr lang="en-US"/>
           </a:p>
@@ -8299,7 +8300,7 @@
           <p:cNvPr id="2" name="Title 1">
             <a:extLst>
               <a:ext uri="{FF2B5EF4-FFF2-40B4-BE49-F238E27FC236}">
-                <a16:creationId xmlns:a16="http://schemas.microsoft.com/office/drawing/2014/main" id="{A1A21F2E-26C6-4143-6A0A-D9589BA91298}"/>
+                <a16:creationId xmlns:a16="http://schemas.microsoft.com/office/drawing/2014/main" id="{C5F2A924-E3CE-1B32-4DCF-CC86D16AF9B9}"/>
               </a:ext>
             </a:extLst>
           </p:cNvPr>
@@ -8317,7 +8318,7 @@
           <a:p>
             <a:r>
               <a:rPr lang="en-US" dirty="0"/>
-              <a:t>Clustering</a:t>
+              <a:t>Recommendations</a:t>
             </a:r>
           </a:p>
         </p:txBody>
@@ -8327,7 +8328,7 @@
           <p:cNvPr id="3" name="Content Placeholder 2">
             <a:extLst>
               <a:ext uri="{FF2B5EF4-FFF2-40B4-BE49-F238E27FC236}">
-                <a16:creationId xmlns:a16="http://schemas.microsoft.com/office/drawing/2014/main" id="{1538C7FF-3DE8-2654-3267-188495E4AAB1}"/>
+                <a16:creationId xmlns:a16="http://schemas.microsoft.com/office/drawing/2014/main" id="{8E4291FB-770F-E9CB-0E32-51552110DDAA}"/>
               </a:ext>
             </a:extLst>
           </p:cNvPr>
@@ -8350,7 +8351,7 @@
     </p:spTree>
     <p:extLst>
       <p:ext uri="{BB962C8B-B14F-4D97-AF65-F5344CB8AC3E}">
-        <p14:creationId xmlns:p14="http://schemas.microsoft.com/office/powerpoint/2010/main" val="519261047"/>
+        <p14:creationId xmlns:p14="http://schemas.microsoft.com/office/powerpoint/2010/main" val="2306104423"/>
       </p:ext>
     </p:extLst>
   </p:cSld>
@@ -8449,6 +8450,89 @@
     <p:extLst>
       <p:ext uri="{BB962C8B-B14F-4D97-AF65-F5344CB8AC3E}">
         <p14:creationId xmlns:p14="http://schemas.microsoft.com/office/powerpoint/2010/main" val="574058091"/>
+      </p:ext>
+    </p:extLst>
+  </p:cSld>
+  <p:clrMapOvr>
+    <a:masterClrMapping/>
+  </p:clrMapOvr>
+</p:sld>
+</file>
+
+<file path=ppt/slides/slide20.xml><?xml version="1.0" encoding="utf-8"?>
+<p:sld xmlns:a="http://schemas.openxmlformats.org/drawingml/2006/main" xmlns:r="http://schemas.openxmlformats.org/officeDocument/2006/relationships" xmlns:p="http://schemas.openxmlformats.org/presentationml/2006/main">
+  <p:cSld>
+    <p:spTree>
+      <p:nvGrpSpPr>
+        <p:cNvPr id="1" name=""/>
+        <p:cNvGrpSpPr/>
+        <p:nvPr/>
+      </p:nvGrpSpPr>
+      <p:grpSpPr>
+        <a:xfrm>
+          <a:off x="0" y="0"/>
+          <a:ext cx="0" cy="0"/>
+          <a:chOff x="0" y="0"/>
+          <a:chExt cx="0" cy="0"/>
+        </a:xfrm>
+      </p:grpSpPr>
+      <p:sp>
+        <p:nvSpPr>
+          <p:cNvPr id="2" name="Title 1">
+            <a:extLst>
+              <a:ext uri="{FF2B5EF4-FFF2-40B4-BE49-F238E27FC236}">
+                <a16:creationId xmlns:a16="http://schemas.microsoft.com/office/drawing/2014/main" id="{966E4AA0-CC06-1FBC-B4EA-14BD41DA495C}"/>
+              </a:ext>
+            </a:extLst>
+          </p:cNvPr>
+          <p:cNvSpPr>
+            <a:spLocks noGrp="1"/>
+          </p:cNvSpPr>
+          <p:nvPr>
+            <p:ph type="title"/>
+          </p:nvPr>
+        </p:nvSpPr>
+        <p:spPr/>
+        <p:txBody>
+          <a:bodyPr/>
+          <a:lstStyle/>
+          <a:p>
+            <a:r>
+              <a:rPr lang="en-US" dirty="0"/>
+              <a:t>Improvements</a:t>
+            </a:r>
+          </a:p>
+        </p:txBody>
+      </p:sp>
+      <p:sp>
+        <p:nvSpPr>
+          <p:cNvPr id="3" name="Content Placeholder 2">
+            <a:extLst>
+              <a:ext uri="{FF2B5EF4-FFF2-40B4-BE49-F238E27FC236}">
+                <a16:creationId xmlns:a16="http://schemas.microsoft.com/office/drawing/2014/main" id="{231168D1-C69A-184B-7FE9-F35DA959A149}"/>
+              </a:ext>
+            </a:extLst>
+          </p:cNvPr>
+          <p:cNvSpPr>
+            <a:spLocks noGrp="1"/>
+          </p:cNvSpPr>
+          <p:nvPr>
+            <p:ph idx="1"/>
+          </p:nvPr>
+        </p:nvSpPr>
+        <p:spPr/>
+        <p:txBody>
+          <a:bodyPr/>
+          <a:lstStyle/>
+          <a:p>
+            <a:endParaRPr lang="en-US" dirty="0"/>
+          </a:p>
+        </p:txBody>
+      </p:sp>
+    </p:spTree>
+    <p:extLst>
+      <p:ext uri="{BB962C8B-B14F-4D97-AF65-F5344CB8AC3E}">
+        <p14:creationId xmlns:p14="http://schemas.microsoft.com/office/powerpoint/2010/main" val="3918422876"/>
       </p:ext>
     </p:extLst>
   </p:cSld>
@@ -8772,17 +8856,8 @@
               <a:rPr lang="en-US" dirty="0">
                 <a:sym typeface="Wingdings" panose="05000000000000000000" pitchFamily="2" charset="2"/>
               </a:rPr>
-              <a:t>Regression Games difference</a:t>
-            </a:r>
-          </a:p>
-          <a:p>
-            <a:r>
-              <a:rPr lang="en-US" dirty="0">
-                <a:sym typeface="Wingdings" panose="05000000000000000000" pitchFamily="2" charset="2"/>
-              </a:rPr>
-              <a:t>Clustering Match type</a:t>
-            </a:r>
-            <a:endParaRPr lang="en-US" dirty="0"/>
+              <a:t>Regression Percentage of points won</a:t>
+            </a:r>
           </a:p>
         </p:txBody>
       </p:sp>

</xml_diff>